<commit_message>
Final commit before/after presentation and maybe the last? :(
</commit_message>
<xml_diff>
--- a/01_ProjectPlanning/Pandemic_Simulator.pptx
+++ b/01_ProjectPlanning/Pandemic_Simulator.pptx
@@ -10,9 +10,9 @@
   <p:sldIdLst>
     <p:sldId id="256" r:id="rId5"/>
     <p:sldId id="257" r:id="rId6"/>
-    <p:sldId id="258" r:id="rId7"/>
-    <p:sldId id="259" r:id="rId8"/>
-    <p:sldId id="260" r:id="rId9"/>
+    <p:sldId id="262" r:id="rId7"/>
+    <p:sldId id="258" r:id="rId8"/>
+    <p:sldId id="259" r:id="rId9"/>
     <p:sldId id="261" r:id="rId10"/>
   </p:sldIdLst>
   <p:sldSz cx="12192000" cy="6858000"/>
@@ -254,7 +254,7 @@
           <a:p>
             <a:fld id="{80CE4FFF-D612-4F0C-B6EA-176D340967A5}" type="datetimeFigureOut">
               <a:rPr lang="de-AT" smtClean="0"/>
-              <a:t>21.06.2022</a:t>
+              <a:t>24.06.2022</a:t>
             </a:fld>
             <a:endParaRPr lang="de-AT" dirty="0"/>
           </a:p>
@@ -728,7 +728,7 @@
             <a:fld id="{597C26C4-D2EA-46AA-9C21-F72B84DD2503}" type="datetime1">
               <a:rPr lang="de-AT" smtClean="0"/>
               <a:pPr/>
-              <a:t>21.06.2022</a:t>
+              <a:t>24.06.2022</a:t>
             </a:fld>
             <a:endParaRPr lang="en-US" dirty="0"/>
           </a:p>
@@ -1168,7 +1168,7 @@
             <a:fld id="{1B42DCCF-8810-4A78-AC7A-DC9DCF993B49}" type="datetime1">
               <a:rPr lang="de-AT" smtClean="0"/>
               <a:pPr/>
-              <a:t>21.06.2022</a:t>
+              <a:t>24.06.2022</a:t>
             </a:fld>
             <a:endParaRPr lang="en-US" dirty="0"/>
           </a:p>
@@ -1437,7 +1437,7 @@
             <a:fld id="{61405B8F-7C39-4A44-86BB-F248B5BFBFEB}" type="datetime1">
               <a:rPr lang="de-AT" smtClean="0"/>
               <a:pPr/>
-              <a:t>21.06.2022</a:t>
+              <a:t>24.06.2022</a:t>
             </a:fld>
             <a:endParaRPr lang="en-US" dirty="0"/>
           </a:p>
@@ -1829,7 +1829,7 @@
             <a:fld id="{A9C90A0B-42DD-44B6-BF8A-5A64196EBF31}" type="datetime1">
               <a:rPr lang="de-AT" smtClean="0"/>
               <a:pPr/>
-              <a:t>21.06.2022</a:t>
+              <a:t>24.06.2022</a:t>
             </a:fld>
             <a:endParaRPr lang="en-US" dirty="0"/>
           </a:p>
@@ -1973,7 +1973,7 @@
             <a:fld id="{3734EAA6-31CB-4D9A-961A-0D4874F3CF3C}" type="datetime1">
               <a:rPr lang="de-AT" smtClean="0"/>
               <a:pPr/>
-              <a:t>21.06.2022</a:t>
+              <a:t>24.06.2022</a:t>
             </a:fld>
             <a:endParaRPr lang="en-US" dirty="0"/>
           </a:p>
@@ -2328,7 +2328,7 @@
             <a:fld id="{B61BEF0D-F0BB-DE4B-95CE-6DB70DBA9567}" type="datetimeFigureOut">
               <a:rPr lang="en-US" dirty="0"/>
               <a:pPr/>
-              <a:t>6/21/2022</a:t>
+              <a:t>6/24/2022</a:t>
             </a:fld>
             <a:endParaRPr lang="en-US" dirty="0"/>
           </a:p>
@@ -2528,7 +2528,7 @@
             <a:fld id="{EF799B2F-AD7F-4D4E-9E0E-087B6B0CB2FB}" type="datetime1">
               <a:rPr lang="de-AT" smtClean="0"/>
               <a:pPr/>
-              <a:t>21.06.2022</a:t>
+              <a:t>24.06.2022</a:t>
             </a:fld>
             <a:endParaRPr lang="en-US" dirty="0"/>
           </a:p>
@@ -3768,7 +3768,7 @@
           <p:cNvPr id="2" name="Titel 1">
             <a:extLst>
               <a:ext uri="{FF2B5EF4-FFF2-40B4-BE49-F238E27FC236}">
-                <a16:creationId xmlns:a16="http://schemas.microsoft.com/office/drawing/2014/main" id="{7405A02F-0619-15DC-A656-44A6598B8DF2}"/>
+                <a16:creationId xmlns:a16="http://schemas.microsoft.com/office/drawing/2014/main" id="{73E8FA8A-D076-A53B-1AA1-4A6CD5E2FB57}"/>
               </a:ext>
             </a:extLst>
           </p:cNvPr>
@@ -3779,15 +3779,23 @@
             <p:ph type="title"/>
           </p:nvPr>
         </p:nvSpPr>
-        <p:spPr/>
-        <p:txBody>
-          <a:bodyPr/>
+        <p:spPr>
+          <a:xfrm>
+            <a:off x="581193" y="729658"/>
+            <a:ext cx="11029616" cy="988332"/>
+          </a:xfrm>
+        </p:spPr>
+        <p:txBody>
+          <a:bodyPr anchor="b">
+            <a:normAutofit/>
+          </a:bodyPr>
           <a:lstStyle/>
           <a:p>
             <a:r>
-              <a:rPr lang="en-US" dirty="0"/>
-              <a:t>How we started </a:t>
-            </a:r>
+              <a:rPr lang="en-US" dirty="0" err="1"/>
+              <a:t>aRCHITECTURE</a:t>
+            </a:r>
+            <a:endParaRPr lang="en-US" dirty="0"/>
           </a:p>
         </p:txBody>
       </p:sp>
@@ -3796,7 +3804,7 @@
           <p:cNvPr id="3" name="Inhaltsplatzhalter 2">
             <a:extLst>
               <a:ext uri="{FF2B5EF4-FFF2-40B4-BE49-F238E27FC236}">
-                <a16:creationId xmlns:a16="http://schemas.microsoft.com/office/drawing/2014/main" id="{016E0131-DED5-EDA3-0BC0-24467F4F0A62}"/>
+                <a16:creationId xmlns:a16="http://schemas.microsoft.com/office/drawing/2014/main" id="{855BFC2A-ACAC-106C-6390-D3C4121B660C}"/>
               </a:ext>
             </a:extLst>
           </p:cNvPr>
@@ -3804,43 +3812,87 @@
             <a:spLocks noGrp="1"/>
           </p:cNvSpPr>
           <p:nvPr>
-            <p:ph idx="1"/>
-          </p:nvPr>
-        </p:nvSpPr>
-        <p:spPr/>
-        <p:txBody>
-          <a:bodyPr/>
+            <p:ph sz="half" idx="1"/>
+          </p:nvPr>
+        </p:nvSpPr>
+        <p:spPr>
+          <a:xfrm>
+            <a:off x="581193" y="2228003"/>
+            <a:ext cx="5422390" cy="3633047"/>
+          </a:xfrm>
+        </p:spPr>
+        <p:txBody>
+          <a:bodyPr anchor="t">
+            <a:normAutofit/>
+          </a:bodyPr>
           <a:lstStyle/>
           <a:p>
             <a:r>
               <a:rPr lang="en-US" dirty="0"/>
-              <a:t>After the project proposal we started to do some research on the different models of how to simulate a virus </a:t>
+              <a:t>We don’t have a big architectural background </a:t>
             </a:r>
           </a:p>
           <a:p>
             <a:r>
               <a:rPr lang="en-US" dirty="0"/>
-              <a:t>This took a while and after we found the right model for us, we started to think about effort estimation</a:t>
+              <a:t>Its like the MVC pattern we learned in Java</a:t>
             </a:r>
           </a:p>
           <a:p>
             <a:r>
               <a:rPr lang="en-US" dirty="0"/>
-              <a:t>At the start we had no idea of how long the individual tasks would take</a:t>
+              <a:t>A model which generates the data for the view</a:t>
             </a:r>
           </a:p>
           <a:p>
             <a:r>
               <a:rPr lang="en-US" dirty="0"/>
-              <a:t>Let's look at our effort estimation list</a:t>
-            </a:r>
-          </a:p>
-        </p:txBody>
-      </p:sp>
+              <a:t>The view which Displays all the data in form of a graph and textural output (JavaFX)</a:t>
+            </a:r>
+          </a:p>
+          <a:p>
+            <a:r>
+              <a:rPr lang="en-US" dirty="0"/>
+              <a:t>A controller which handles the view </a:t>
+            </a:r>
+          </a:p>
+        </p:txBody>
+      </p:sp>
+      <p:pic>
+        <p:nvPicPr>
+          <p:cNvPr id="5" name="Grafik 4">
+            <a:extLst>
+              <a:ext uri="{FF2B5EF4-FFF2-40B4-BE49-F238E27FC236}">
+                <a16:creationId xmlns:a16="http://schemas.microsoft.com/office/drawing/2014/main" id="{3C40081F-E895-A884-9434-40040A483ADD}"/>
+              </a:ext>
+            </a:extLst>
+          </p:cNvPr>
+          <p:cNvPicPr>
+            <a:picLocks noChangeAspect="1"/>
+          </p:cNvPicPr>
+          <p:nvPr/>
+        </p:nvPicPr>
+        <p:blipFill>
+          <a:blip r:embed="rId2"/>
+          <a:stretch>
+            <a:fillRect/>
+          </a:stretch>
+        </p:blipFill>
+        <p:spPr>
+          <a:xfrm>
+            <a:off x="6188417" y="2465255"/>
+            <a:ext cx="5422392" cy="3158543"/>
+          </a:xfrm>
+          <a:prstGeom prst="rect">
+            <a:avLst/>
+          </a:prstGeom>
+          <a:noFill/>
+        </p:spPr>
+      </p:pic>
     </p:spTree>
     <p:extLst>
       <p:ext uri="{BB962C8B-B14F-4D97-AF65-F5344CB8AC3E}">
-        <p14:creationId xmlns:p14="http://schemas.microsoft.com/office/powerpoint/2010/main" val="3094874580"/>
+        <p14:creationId xmlns:p14="http://schemas.microsoft.com/office/powerpoint/2010/main" val="3237482541"/>
       </p:ext>
     </p:extLst>
   </p:cSld>
@@ -3872,7 +3924,7 @@
           <p:cNvPr id="2" name="Titel 1">
             <a:extLst>
               <a:ext uri="{FF2B5EF4-FFF2-40B4-BE49-F238E27FC236}">
-                <a16:creationId xmlns:a16="http://schemas.microsoft.com/office/drawing/2014/main" id="{AE7C68EA-FCA6-5E92-16DC-25EC0212F4A8}"/>
+                <a16:creationId xmlns:a16="http://schemas.microsoft.com/office/drawing/2014/main" id="{7405A02F-0619-15DC-A656-44A6598B8DF2}"/>
               </a:ext>
             </a:extLst>
           </p:cNvPr>
@@ -3890,7 +3942,7 @@
           <a:p>
             <a:r>
               <a:rPr lang="en-US" dirty="0"/>
-              <a:t>What we used for implementing</a:t>
+              <a:t>How we started </a:t>
             </a:r>
           </a:p>
         </p:txBody>
@@ -3900,7 +3952,7 @@
           <p:cNvPr id="3" name="Inhaltsplatzhalter 2">
             <a:extLst>
               <a:ext uri="{FF2B5EF4-FFF2-40B4-BE49-F238E27FC236}">
-                <a16:creationId xmlns:a16="http://schemas.microsoft.com/office/drawing/2014/main" id="{45EF4691-91F1-EEFB-9846-2DBDB4FB036D}"/>
+                <a16:creationId xmlns:a16="http://schemas.microsoft.com/office/drawing/2014/main" id="{016E0131-DED5-EDA3-0BC0-24467F4F0A62}"/>
               </a:ext>
             </a:extLst>
           </p:cNvPr>
@@ -3918,35 +3970,25 @@
           <a:p>
             <a:r>
               <a:rPr lang="en-US" dirty="0"/>
-              <a:t>As a language we used java and </a:t>
-            </a:r>
-            <a:r>
-              <a:rPr lang="en-US" dirty="0" err="1"/>
-              <a:t>javaFX</a:t>
-            </a:r>
-            <a:endParaRPr lang="en-US" dirty="0"/>
+              <a:t>After the project proposal we started to do some research on the different models of how to simulate a virus </a:t>
+            </a:r>
           </a:p>
           <a:p>
             <a:r>
               <a:rPr lang="en-US" dirty="0"/>
-              <a:t>As an IDE we used IntelliJ IDEA Ultimate</a:t>
+              <a:t>This took a while and after we found the right model for us, we started to think about effort estimation</a:t>
             </a:r>
           </a:p>
           <a:p>
             <a:r>
               <a:rPr lang="en-US" dirty="0"/>
-              <a:t>For source control we used </a:t>
-            </a:r>
-            <a:r>
-              <a:rPr lang="en-US" dirty="0" err="1"/>
-              <a:t>Github</a:t>
-            </a:r>
-            <a:endParaRPr lang="en-US" dirty="0"/>
+              <a:t>At the start we had no idea of how long the individual tasks would take</a:t>
+            </a:r>
           </a:p>
           <a:p>
             <a:r>
               <a:rPr lang="en-US" dirty="0"/>
-              <a:t>Enough talking, let’s take a look at the project</a:t>
+              <a:t>Simon will give you a quick overview about the model we used</a:t>
             </a:r>
           </a:p>
         </p:txBody>
@@ -3954,122 +3996,7 @@
     </p:spTree>
     <p:extLst>
       <p:ext uri="{BB962C8B-B14F-4D97-AF65-F5344CB8AC3E}">
-        <p14:creationId xmlns:p14="http://schemas.microsoft.com/office/powerpoint/2010/main" val="1174893062"/>
-      </p:ext>
-    </p:extLst>
-  </p:cSld>
-  <p:clrMapOvr>
-    <a:masterClrMapping/>
-  </p:clrMapOvr>
-</p:sld>
-</file>
-
-<file path=ppt/slides/slide5.xml><?xml version="1.0" encoding="utf-8"?>
-<p:sld xmlns:a="http://schemas.openxmlformats.org/drawingml/2006/main" xmlns:r="http://schemas.openxmlformats.org/officeDocument/2006/relationships" xmlns:p="http://schemas.openxmlformats.org/presentationml/2006/main">
-  <p:cSld>
-    <p:spTree>
-      <p:nvGrpSpPr>
-        <p:cNvPr id="1" name=""/>
-        <p:cNvGrpSpPr/>
-        <p:nvPr/>
-      </p:nvGrpSpPr>
-      <p:grpSpPr>
-        <a:xfrm>
-          <a:off x="0" y="0"/>
-          <a:ext cx="0" cy="0"/>
-          <a:chOff x="0" y="0"/>
-          <a:chExt cx="0" cy="0"/>
-        </a:xfrm>
-      </p:grpSpPr>
-      <p:sp>
-        <p:nvSpPr>
-          <p:cNvPr id="2" name="Titel 1">
-            <a:extLst>
-              <a:ext uri="{FF2B5EF4-FFF2-40B4-BE49-F238E27FC236}">
-                <a16:creationId xmlns:a16="http://schemas.microsoft.com/office/drawing/2014/main" id="{8801EF94-C6CE-2E41-D934-6BCC24B4F1D8}"/>
-              </a:ext>
-            </a:extLst>
-          </p:cNvPr>
-          <p:cNvSpPr>
-            <a:spLocks noGrp="1"/>
-          </p:cNvSpPr>
-          <p:nvPr>
-            <p:ph type="title"/>
-          </p:nvPr>
-        </p:nvSpPr>
-        <p:spPr/>
-        <p:txBody>
-          <a:bodyPr/>
-          <a:lstStyle/>
-          <a:p>
-            <a:r>
-              <a:rPr lang="en-US" dirty="0"/>
-              <a:t>After the demo – Summary</a:t>
-            </a:r>
-          </a:p>
-        </p:txBody>
-      </p:sp>
-      <p:sp>
-        <p:nvSpPr>
-          <p:cNvPr id="3" name="Inhaltsplatzhalter 2">
-            <a:extLst>
-              <a:ext uri="{FF2B5EF4-FFF2-40B4-BE49-F238E27FC236}">
-                <a16:creationId xmlns:a16="http://schemas.microsoft.com/office/drawing/2014/main" id="{2BA6D268-B1E2-B510-C345-0CB76219347D}"/>
-              </a:ext>
-            </a:extLst>
-          </p:cNvPr>
-          <p:cNvSpPr>
-            <a:spLocks noGrp="1"/>
-          </p:cNvSpPr>
-          <p:nvPr>
-            <p:ph idx="1"/>
-          </p:nvPr>
-        </p:nvSpPr>
-        <p:spPr/>
-        <p:txBody>
-          <a:bodyPr/>
-          <a:lstStyle/>
-          <a:p>
-            <a:r>
-              <a:rPr lang="en-US" dirty="0"/>
-              <a:t>We would never do something like this ever again</a:t>
-            </a:r>
-          </a:p>
-          <a:p>
-            <a:r>
-              <a:rPr lang="en-US" dirty="0"/>
-              <a:t>Effort estimation and research was a really tedious process because it was a very abstract topic and there was hardly any research to go off of.</a:t>
-            </a:r>
-          </a:p>
-          <a:p>
-            <a:r>
-              <a:rPr lang="en-US" dirty="0"/>
-              <a:t>The beginning was the hardest part since it was such a complex project, and we didn’t know where to start implementation.</a:t>
-            </a:r>
-          </a:p>
-          <a:p>
-            <a:r>
-              <a:rPr lang="en-US" dirty="0"/>
-              <a:t>After the first few test runs, we realized that our computing power was only enough to simulate a tiny </a:t>
-            </a:r>
-            <a:r>
-              <a:rPr lang="en-US" dirty="0" err="1"/>
-              <a:t>epedemic</a:t>
-            </a:r>
-            <a:endParaRPr lang="en-US" dirty="0"/>
-          </a:p>
-          <a:p>
-            <a:endParaRPr lang="en-US" dirty="0"/>
-          </a:p>
-          <a:p>
-            <a:endParaRPr lang="en-US" dirty="0"/>
-          </a:p>
-        </p:txBody>
-      </p:sp>
-    </p:spTree>
-    <p:extLst>
-      <p:ext uri="{BB962C8B-B14F-4D97-AF65-F5344CB8AC3E}">
-        <p14:creationId xmlns:p14="http://schemas.microsoft.com/office/powerpoint/2010/main" val="1445970283"/>
+        <p14:creationId xmlns:p14="http://schemas.microsoft.com/office/powerpoint/2010/main" val="3094874580"/>
       </p:ext>
     </p:extLst>
   </p:cSld>
@@ -4112,7 +4039,7 @@
                                         <p:tgtEl>
                                           <p:spTgt spid="3">
                                             <p:txEl>
-                                              <p:pRg st="0" end="0"/>
+                                              <p:pRg st="3" end="3"/>
                                             </p:txEl>
                                           </p:spTgt>
                                         </p:tgtEl>
@@ -4127,315 +4054,6 @@
                                     <p:anim calcmode="lin" valueType="num">
                                       <p:cBhvr additive="base">
                                         <p:cTn id="7" dur="500" fill="hold"/>
-                                        <p:tgtEl>
-                                          <p:spTgt spid="3">
-                                            <p:txEl>
-                                              <p:pRg st="0" end="0"/>
-                                            </p:txEl>
-                                          </p:spTgt>
-                                        </p:tgtEl>
-                                        <p:attrNameLst>
-                                          <p:attrName>ppt_x</p:attrName>
-                                        </p:attrNameLst>
-                                      </p:cBhvr>
-                                      <p:tavLst>
-                                        <p:tav tm="0">
-                                          <p:val>
-                                            <p:strVal val="#ppt_x"/>
-                                          </p:val>
-                                        </p:tav>
-                                        <p:tav tm="100000">
-                                          <p:val>
-                                            <p:strVal val="#ppt_x"/>
-                                          </p:val>
-                                        </p:tav>
-                                      </p:tavLst>
-                                    </p:anim>
-                                    <p:anim calcmode="lin" valueType="num">
-                                      <p:cBhvr additive="base">
-                                        <p:cTn id="8" dur="500" fill="hold"/>
-                                        <p:tgtEl>
-                                          <p:spTgt spid="3">
-                                            <p:txEl>
-                                              <p:pRg st="0" end="0"/>
-                                            </p:txEl>
-                                          </p:spTgt>
-                                        </p:tgtEl>
-                                        <p:attrNameLst>
-                                          <p:attrName>ppt_y</p:attrName>
-                                        </p:attrNameLst>
-                                      </p:cBhvr>
-                                      <p:tavLst>
-                                        <p:tav tm="0">
-                                          <p:val>
-                                            <p:strVal val="1+#ppt_h/2"/>
-                                          </p:val>
-                                        </p:tav>
-                                        <p:tav tm="100000">
-                                          <p:val>
-                                            <p:strVal val="#ppt_y"/>
-                                          </p:val>
-                                        </p:tav>
-                                      </p:tavLst>
-                                    </p:anim>
-                                  </p:childTnLst>
-                                </p:cTn>
-                              </p:par>
-                            </p:childTnLst>
-                          </p:cTn>
-                        </p:par>
-                      </p:childTnLst>
-                    </p:cTn>
-                  </p:par>
-                  <p:par>
-                    <p:cTn id="9" fill="hold">
-                      <p:stCondLst>
-                        <p:cond delay="indefinite"/>
-                      </p:stCondLst>
-                      <p:childTnLst>
-                        <p:par>
-                          <p:cTn id="10" fill="hold">
-                            <p:stCondLst>
-                              <p:cond delay="0"/>
-                            </p:stCondLst>
-                            <p:childTnLst>
-                              <p:par>
-                                <p:cTn id="11" presetID="2" presetClass="entr" presetSubtype="4" fill="hold" nodeType="clickEffect">
-                                  <p:stCondLst>
-                                    <p:cond delay="0"/>
-                                  </p:stCondLst>
-                                  <p:childTnLst>
-                                    <p:set>
-                                      <p:cBhvr>
-                                        <p:cTn id="12" dur="1" fill="hold">
-                                          <p:stCondLst>
-                                            <p:cond delay="0"/>
-                                          </p:stCondLst>
-                                        </p:cTn>
-                                        <p:tgtEl>
-                                          <p:spTgt spid="3">
-                                            <p:txEl>
-                                              <p:pRg st="1" end="1"/>
-                                            </p:txEl>
-                                          </p:spTgt>
-                                        </p:tgtEl>
-                                        <p:attrNameLst>
-                                          <p:attrName>style.visibility</p:attrName>
-                                        </p:attrNameLst>
-                                      </p:cBhvr>
-                                      <p:to>
-                                        <p:strVal val="visible"/>
-                                      </p:to>
-                                    </p:set>
-                                    <p:anim calcmode="lin" valueType="num">
-                                      <p:cBhvr additive="base">
-                                        <p:cTn id="13" dur="500" fill="hold"/>
-                                        <p:tgtEl>
-                                          <p:spTgt spid="3">
-                                            <p:txEl>
-                                              <p:pRg st="1" end="1"/>
-                                            </p:txEl>
-                                          </p:spTgt>
-                                        </p:tgtEl>
-                                        <p:attrNameLst>
-                                          <p:attrName>ppt_x</p:attrName>
-                                        </p:attrNameLst>
-                                      </p:cBhvr>
-                                      <p:tavLst>
-                                        <p:tav tm="0">
-                                          <p:val>
-                                            <p:strVal val="#ppt_x"/>
-                                          </p:val>
-                                        </p:tav>
-                                        <p:tav tm="100000">
-                                          <p:val>
-                                            <p:strVal val="#ppt_x"/>
-                                          </p:val>
-                                        </p:tav>
-                                      </p:tavLst>
-                                    </p:anim>
-                                    <p:anim calcmode="lin" valueType="num">
-                                      <p:cBhvr additive="base">
-                                        <p:cTn id="14" dur="500" fill="hold"/>
-                                        <p:tgtEl>
-                                          <p:spTgt spid="3">
-                                            <p:txEl>
-                                              <p:pRg st="1" end="1"/>
-                                            </p:txEl>
-                                          </p:spTgt>
-                                        </p:tgtEl>
-                                        <p:attrNameLst>
-                                          <p:attrName>ppt_y</p:attrName>
-                                        </p:attrNameLst>
-                                      </p:cBhvr>
-                                      <p:tavLst>
-                                        <p:tav tm="0">
-                                          <p:val>
-                                            <p:strVal val="1+#ppt_h/2"/>
-                                          </p:val>
-                                        </p:tav>
-                                        <p:tav tm="100000">
-                                          <p:val>
-                                            <p:strVal val="#ppt_y"/>
-                                          </p:val>
-                                        </p:tav>
-                                      </p:tavLst>
-                                    </p:anim>
-                                  </p:childTnLst>
-                                </p:cTn>
-                              </p:par>
-                            </p:childTnLst>
-                          </p:cTn>
-                        </p:par>
-                      </p:childTnLst>
-                    </p:cTn>
-                  </p:par>
-                  <p:par>
-                    <p:cTn id="15" fill="hold">
-                      <p:stCondLst>
-                        <p:cond delay="indefinite"/>
-                      </p:stCondLst>
-                      <p:childTnLst>
-                        <p:par>
-                          <p:cTn id="16" fill="hold">
-                            <p:stCondLst>
-                              <p:cond delay="0"/>
-                            </p:stCondLst>
-                            <p:childTnLst>
-                              <p:par>
-                                <p:cTn id="17" presetID="2" presetClass="entr" presetSubtype="4" fill="hold" nodeType="clickEffect">
-                                  <p:stCondLst>
-                                    <p:cond delay="0"/>
-                                  </p:stCondLst>
-                                  <p:childTnLst>
-                                    <p:set>
-                                      <p:cBhvr>
-                                        <p:cTn id="18" dur="1" fill="hold">
-                                          <p:stCondLst>
-                                            <p:cond delay="0"/>
-                                          </p:stCondLst>
-                                        </p:cTn>
-                                        <p:tgtEl>
-                                          <p:spTgt spid="3">
-                                            <p:txEl>
-                                              <p:pRg st="2" end="2"/>
-                                            </p:txEl>
-                                          </p:spTgt>
-                                        </p:tgtEl>
-                                        <p:attrNameLst>
-                                          <p:attrName>style.visibility</p:attrName>
-                                        </p:attrNameLst>
-                                      </p:cBhvr>
-                                      <p:to>
-                                        <p:strVal val="visible"/>
-                                      </p:to>
-                                    </p:set>
-                                    <p:anim calcmode="lin" valueType="num">
-                                      <p:cBhvr additive="base">
-                                        <p:cTn id="19" dur="500" fill="hold"/>
-                                        <p:tgtEl>
-                                          <p:spTgt spid="3">
-                                            <p:txEl>
-                                              <p:pRg st="2" end="2"/>
-                                            </p:txEl>
-                                          </p:spTgt>
-                                        </p:tgtEl>
-                                        <p:attrNameLst>
-                                          <p:attrName>ppt_x</p:attrName>
-                                        </p:attrNameLst>
-                                      </p:cBhvr>
-                                      <p:tavLst>
-                                        <p:tav tm="0">
-                                          <p:val>
-                                            <p:strVal val="#ppt_x"/>
-                                          </p:val>
-                                        </p:tav>
-                                        <p:tav tm="100000">
-                                          <p:val>
-                                            <p:strVal val="#ppt_x"/>
-                                          </p:val>
-                                        </p:tav>
-                                      </p:tavLst>
-                                    </p:anim>
-                                    <p:anim calcmode="lin" valueType="num">
-                                      <p:cBhvr additive="base">
-                                        <p:cTn id="20" dur="500" fill="hold"/>
-                                        <p:tgtEl>
-                                          <p:spTgt spid="3">
-                                            <p:txEl>
-                                              <p:pRg st="2" end="2"/>
-                                            </p:txEl>
-                                          </p:spTgt>
-                                        </p:tgtEl>
-                                        <p:attrNameLst>
-                                          <p:attrName>ppt_y</p:attrName>
-                                        </p:attrNameLst>
-                                      </p:cBhvr>
-                                      <p:tavLst>
-                                        <p:tav tm="0">
-                                          <p:val>
-                                            <p:strVal val="1+#ppt_h/2"/>
-                                          </p:val>
-                                        </p:tav>
-                                        <p:tav tm="100000">
-                                          <p:val>
-                                            <p:strVal val="#ppt_y"/>
-                                          </p:val>
-                                        </p:tav>
-                                      </p:tavLst>
-                                    </p:anim>
-                                  </p:childTnLst>
-                                </p:cTn>
-                              </p:par>
-                            </p:childTnLst>
-                          </p:cTn>
-                        </p:par>
-                      </p:childTnLst>
-                    </p:cTn>
-                  </p:par>
-                  <p:par>
-                    <p:cTn id="21" fill="hold">
-                      <p:stCondLst>
-                        <p:cond delay="indefinite"/>
-                      </p:stCondLst>
-                      <p:childTnLst>
-                        <p:par>
-                          <p:cTn id="22" fill="hold">
-                            <p:stCondLst>
-                              <p:cond delay="0"/>
-                            </p:stCondLst>
-                            <p:childTnLst>
-                              <p:par>
-                                <p:cTn id="23" presetID="2" presetClass="entr" presetSubtype="4" fill="hold" nodeType="clickEffect">
-                                  <p:stCondLst>
-                                    <p:cond delay="0"/>
-                                  </p:stCondLst>
-                                  <p:childTnLst>
-                                    <p:set>
-                                      <p:cBhvr>
-                                        <p:cTn id="24" dur="1" fill="hold">
-                                          <p:stCondLst>
-                                            <p:cond delay="0"/>
-                                          </p:stCondLst>
-                                        </p:cTn>
-                                        <p:tgtEl>
-                                          <p:spTgt spid="3">
-                                            <p:txEl>
-                                              <p:pRg st="3" end="3"/>
-                                            </p:txEl>
-                                          </p:spTgt>
-                                        </p:tgtEl>
-                                        <p:attrNameLst>
-                                          <p:attrName>style.visibility</p:attrName>
-                                        </p:attrNameLst>
-                                      </p:cBhvr>
-                                      <p:to>
-                                        <p:strVal val="visible"/>
-                                      </p:to>
-                                    </p:set>
-                                    <p:anim calcmode="lin" valueType="num">
-                                      <p:cBhvr additive="base">
-                                        <p:cTn id="25" dur="500" fill="hold"/>
                                         <p:tgtEl>
                                           <p:spTgt spid="3">
                                             <p:txEl>
@@ -4462,7 +4080,7 @@
                                     </p:anim>
                                     <p:anim calcmode="lin" valueType="num">
                                       <p:cBhvr additive="base">
-                                        <p:cTn id="26" dur="500" fill="hold"/>
+                                        <p:cTn id="8" dur="500" fill="hold"/>
                                         <p:tgtEl>
                                           <p:spTgt spid="3">
                                             <p:txEl>
@@ -4518,6 +4136,92 @@
       </p:par>
     </p:tnLst>
   </p:timing>
+</p:sld>
+</file>
+
+<file path=ppt/slides/slide5.xml><?xml version="1.0" encoding="utf-8"?>
+<p:sld xmlns:a="http://schemas.openxmlformats.org/drawingml/2006/main" xmlns:r="http://schemas.openxmlformats.org/officeDocument/2006/relationships" xmlns:p="http://schemas.openxmlformats.org/presentationml/2006/main">
+  <p:cSld>
+    <p:spTree>
+      <p:nvGrpSpPr>
+        <p:cNvPr id="1" name=""/>
+        <p:cNvGrpSpPr/>
+        <p:nvPr/>
+      </p:nvGrpSpPr>
+      <p:grpSpPr>
+        <a:xfrm>
+          <a:off x="0" y="0"/>
+          <a:ext cx="0" cy="0"/>
+          <a:chOff x="0" y="0"/>
+          <a:chExt cx="0" cy="0"/>
+        </a:xfrm>
+      </p:grpSpPr>
+      <p:sp>
+        <p:nvSpPr>
+          <p:cNvPr id="4" name="Titel 3">
+            <a:extLst>
+              <a:ext uri="{FF2B5EF4-FFF2-40B4-BE49-F238E27FC236}">
+                <a16:creationId xmlns:a16="http://schemas.microsoft.com/office/drawing/2014/main" id="{05E19DB3-9E3E-F098-358F-C9E86C73C47B}"/>
+              </a:ext>
+            </a:extLst>
+          </p:cNvPr>
+          <p:cNvSpPr>
+            <a:spLocks noGrp="1"/>
+          </p:cNvSpPr>
+          <p:nvPr>
+            <p:ph type="ctrTitle"/>
+          </p:nvPr>
+        </p:nvSpPr>
+        <p:spPr/>
+        <p:txBody>
+          <a:bodyPr/>
+          <a:lstStyle/>
+          <a:p>
+            <a:r>
+              <a:rPr lang="en-US" dirty="0"/>
+              <a:t>Let's take a look at the project!</a:t>
+            </a:r>
+          </a:p>
+        </p:txBody>
+      </p:sp>
+      <p:sp>
+        <p:nvSpPr>
+          <p:cNvPr id="3" name="Inhaltsplatzhalter 2">
+            <a:extLst>
+              <a:ext uri="{FF2B5EF4-FFF2-40B4-BE49-F238E27FC236}">
+                <a16:creationId xmlns:a16="http://schemas.microsoft.com/office/drawing/2014/main" id="{45EF4691-91F1-EEFB-9846-2DBDB4FB036D}"/>
+              </a:ext>
+            </a:extLst>
+          </p:cNvPr>
+          <p:cNvSpPr>
+            <a:spLocks noGrp="1"/>
+          </p:cNvSpPr>
+          <p:nvPr>
+            <p:ph type="subTitle" idx="1"/>
+          </p:nvPr>
+        </p:nvSpPr>
+        <p:spPr/>
+        <p:txBody>
+          <a:bodyPr/>
+          <a:lstStyle/>
+          <a:p>
+            <a:pPr marL="0" indent="0">
+              <a:buNone/>
+            </a:pPr>
+            <a:endParaRPr lang="en-US" dirty="0"/>
+          </a:p>
+        </p:txBody>
+      </p:sp>
+    </p:spTree>
+    <p:extLst>
+      <p:ext uri="{BB962C8B-B14F-4D97-AF65-F5344CB8AC3E}">
+        <p14:creationId xmlns:p14="http://schemas.microsoft.com/office/powerpoint/2010/main" val="1174893062"/>
+      </p:ext>
+    </p:extLst>
+  </p:cSld>
+  <p:clrMapOvr>
+    <a:masterClrMapping/>
+  </p:clrMapOvr>
 </p:sld>
 </file>
 
@@ -5189,6 +4893,15 @@
 </file>
 
 <file path=customXml/item1.xml><?xml version="1.0" encoding="utf-8"?>
+<?mso-contentType ?>
+<FormTemplates xmlns="http://schemas.microsoft.com/sharepoint/v3/contenttype/forms">
+  <Display>DocumentLibraryForm</Display>
+  <Edit>DocumentLibraryForm</Edit>
+  <New>DocumentLibraryForm</New>
+</FormTemplates>
+</file>
+
+<file path=customXml/item2.xml><?xml version="1.0" encoding="utf-8"?>
 <ct:contentTypeSchema xmlns:ct="http://schemas.microsoft.com/office/2006/metadata/contentType" xmlns:ma="http://schemas.microsoft.com/office/2006/metadata/properties/metaAttributes" ct:_="" ma:_="" ma:contentTypeName="Dokument" ma:contentTypeID="0x010100EF9D1BE57B68764B922C941A42498373" ma:contentTypeVersion="10" ma:contentTypeDescription="Ein neues Dokument erstellen." ma:contentTypeScope="" ma:versionID="0624ab5555de4ef968f29f79e84ee4bd">
   <xsd:schema xmlns:xsd="http://www.w3.org/2001/XMLSchema" xmlns:xs="http://www.w3.org/2001/XMLSchema" xmlns:p="http://schemas.microsoft.com/office/2006/metadata/properties" xmlns:ns2="b335865e-f916-4352-aad0-fdba2cf2b539" targetNamespace="http://schemas.microsoft.com/office/2006/metadata/properties" ma:root="true" ma:fieldsID="a2fbb0c2c5e29d0cdcfd3f3100c6bbd2" ns2:_="">
     <xsd:import namespace="b335865e-f916-4352-aad0-fdba2cf2b539"/>
@@ -5372,15 +5085,6 @@
 </ct:contentTypeSchema>
 </file>
 
-<file path=customXml/item2.xml><?xml version="1.0" encoding="utf-8"?>
-<?mso-contentType ?>
-<FormTemplates xmlns="http://schemas.microsoft.com/sharepoint/v3/contenttype/forms">
-  <Display>DocumentLibraryForm</Display>
-  <Edit>DocumentLibraryForm</Edit>
-  <New>DocumentLibraryForm</New>
-</FormTemplates>
-</file>
-
 <file path=customXml/item3.xml><?xml version="1.0" encoding="utf-8"?>
 <p:properties xmlns:p="http://schemas.microsoft.com/office/2006/metadata/properties" xmlns:xsi="http://www.w3.org/2001/XMLSchema-instance" xmlns:pc="http://schemas.microsoft.com/office/infopath/2007/PartnerControls">
   <documentManagement/>
@@ -5388,6 +5092,14 @@
 </file>
 
 <file path=customXml/itemProps1.xml><?xml version="1.0" encoding="utf-8"?>
+<ds:datastoreItem xmlns:ds="http://schemas.openxmlformats.org/officeDocument/2006/customXml" ds:itemID="{0B9D4264-239E-4CF5-A0AD-E91DBA7C27AD}">
+  <ds:schemaRefs>
+    <ds:schemaRef ds:uri="http://schemas.microsoft.com/sharepoint/v3/contenttype/forms"/>
+  </ds:schemaRefs>
+</ds:datastoreItem>
+</file>
+
+<file path=customXml/itemProps2.xml><?xml version="1.0" encoding="utf-8"?>
 <ds:datastoreItem xmlns:ds="http://schemas.openxmlformats.org/officeDocument/2006/customXml" ds:itemID="{EBD4CD9D-FAE2-4442-AEFA-B0162758BB7B}">
   <ds:schemaRefs>
     <ds:schemaRef ds:uri="http://schemas.microsoft.com/office/2006/metadata/contentType"/>
@@ -5405,14 +5117,6 @@
 </ds:datastoreItem>
 </file>
 
-<file path=customXml/itemProps2.xml><?xml version="1.0" encoding="utf-8"?>
-<ds:datastoreItem xmlns:ds="http://schemas.openxmlformats.org/officeDocument/2006/customXml" ds:itemID="{0B9D4264-239E-4CF5-A0AD-E91DBA7C27AD}">
-  <ds:schemaRefs>
-    <ds:schemaRef ds:uri="http://schemas.microsoft.com/sharepoint/v3/contenttype/forms"/>
-  </ds:schemaRefs>
-</ds:datastoreItem>
-</file>
-
 <file path=customXml/itemProps3.xml><?xml version="1.0" encoding="utf-8"?>
 <ds:datastoreItem xmlns:ds="http://schemas.openxmlformats.org/officeDocument/2006/customXml" ds:itemID="{9901D01E-FCB4-4855-8007-F176F2325C5E}">
   <ds:schemaRefs>

</xml_diff>